<commit_message>
All - make logo thicker, bolder, stronger, without taking up any more space than it already does
</commit_message>
<xml_diff>
--- a/assets/images/originals/AI/PowerPoint.pptx
+++ b/assets/images/originals/AI/PowerPoint.pptx
@@ -11,10 +11,6 @@
     <p:sldId id="262" r:id="rId5"/>
     <p:sldId id="259" r:id="rId6"/>
     <p:sldId id="260" r:id="rId7"/>
-    <p:sldId id="263" r:id="rId8"/>
-    <p:sldId id="266" r:id="rId9"/>
-    <p:sldId id="265" r:id="rId10"/>
-    <p:sldId id="264" r:id="rId11"/>
   </p:sldIdLst>
   <p:sldSz cx="12192000" cy="6858000"/>
   <p:notesSz cx="6858000" cy="9144000"/>
@@ -270,7 +266,7 @@
           <a:p>
             <a:fld id="{58F9C490-29EC-4271-B490-D7D2BCAE210B}" type="datetimeFigureOut">
               <a:rPr lang="en-GB" smtClean="0"/>
-              <a:t>08/09/2025</a:t>
+              <a:t>24/01/2026</a:t>
             </a:fld>
             <a:endParaRPr lang="en-GB"/>
           </a:p>
@@ -470,7 +466,7 @@
           <a:p>
             <a:fld id="{58F9C490-29EC-4271-B490-D7D2BCAE210B}" type="datetimeFigureOut">
               <a:rPr lang="en-GB" smtClean="0"/>
-              <a:t>08/09/2025</a:t>
+              <a:t>24/01/2026</a:t>
             </a:fld>
             <a:endParaRPr lang="en-GB"/>
           </a:p>
@@ -680,7 +676,7 @@
           <a:p>
             <a:fld id="{58F9C490-29EC-4271-B490-D7D2BCAE210B}" type="datetimeFigureOut">
               <a:rPr lang="en-GB" smtClean="0"/>
-              <a:t>08/09/2025</a:t>
+              <a:t>24/01/2026</a:t>
             </a:fld>
             <a:endParaRPr lang="en-GB"/>
           </a:p>
@@ -880,7 +876,7 @@
           <a:p>
             <a:fld id="{58F9C490-29EC-4271-B490-D7D2BCAE210B}" type="datetimeFigureOut">
               <a:rPr lang="en-GB" smtClean="0"/>
-              <a:t>08/09/2025</a:t>
+              <a:t>24/01/2026</a:t>
             </a:fld>
             <a:endParaRPr lang="en-GB"/>
           </a:p>
@@ -1156,7 +1152,7 @@
           <a:p>
             <a:fld id="{58F9C490-29EC-4271-B490-D7D2BCAE210B}" type="datetimeFigureOut">
               <a:rPr lang="en-GB" smtClean="0"/>
-              <a:t>08/09/2025</a:t>
+              <a:t>24/01/2026</a:t>
             </a:fld>
             <a:endParaRPr lang="en-GB"/>
           </a:p>
@@ -1424,7 +1420,7 @@
           <a:p>
             <a:fld id="{58F9C490-29EC-4271-B490-D7D2BCAE210B}" type="datetimeFigureOut">
               <a:rPr lang="en-GB" smtClean="0"/>
-              <a:t>08/09/2025</a:t>
+              <a:t>24/01/2026</a:t>
             </a:fld>
             <a:endParaRPr lang="en-GB"/>
           </a:p>
@@ -1839,7 +1835,7 @@
           <a:p>
             <a:fld id="{58F9C490-29EC-4271-B490-D7D2BCAE210B}" type="datetimeFigureOut">
               <a:rPr lang="en-GB" smtClean="0"/>
-              <a:t>08/09/2025</a:t>
+              <a:t>24/01/2026</a:t>
             </a:fld>
             <a:endParaRPr lang="en-GB"/>
           </a:p>
@@ -1981,7 +1977,7 @@
           <a:p>
             <a:fld id="{58F9C490-29EC-4271-B490-D7D2BCAE210B}" type="datetimeFigureOut">
               <a:rPr lang="en-GB" smtClean="0"/>
-              <a:t>08/09/2025</a:t>
+              <a:t>24/01/2026</a:t>
             </a:fld>
             <a:endParaRPr lang="en-GB"/>
           </a:p>
@@ -2094,7 +2090,7 @@
           <a:p>
             <a:fld id="{58F9C490-29EC-4271-B490-D7D2BCAE210B}" type="datetimeFigureOut">
               <a:rPr lang="en-GB" smtClean="0"/>
-              <a:t>08/09/2025</a:t>
+              <a:t>24/01/2026</a:t>
             </a:fld>
             <a:endParaRPr lang="en-GB"/>
           </a:p>
@@ -2407,7 +2403,7 @@
           <a:p>
             <a:fld id="{58F9C490-29EC-4271-B490-D7D2BCAE210B}" type="datetimeFigureOut">
               <a:rPr lang="en-GB" smtClean="0"/>
-              <a:t>08/09/2025</a:t>
+              <a:t>24/01/2026</a:t>
             </a:fld>
             <a:endParaRPr lang="en-GB"/>
           </a:p>
@@ -2696,7 +2692,7 @@
           <a:p>
             <a:fld id="{58F9C490-29EC-4271-B490-D7D2BCAE210B}" type="datetimeFigureOut">
               <a:rPr lang="en-GB" smtClean="0"/>
-              <a:t>08/09/2025</a:t>
+              <a:t>24/01/2026</a:t>
             </a:fld>
             <a:endParaRPr lang="en-GB"/>
           </a:p>
@@ -2939,7 +2935,7 @@
           <a:p>
             <a:fld id="{58F9C490-29EC-4271-B490-D7D2BCAE210B}" type="datetimeFigureOut">
               <a:rPr lang="en-GB" smtClean="0"/>
-              <a:t>08/09/2025</a:t>
+              <a:t>24/01/2026</a:t>
             </a:fld>
             <a:endParaRPr lang="en-GB"/>
           </a:p>
@@ -3501,42 +3497,6 @@
 </p:sld>
 </file>
 
-<file path=ppt/slides/slide10.xml><?xml version="1.0" encoding="utf-8"?>
-<p:sld xmlns:a="http://schemas.openxmlformats.org/drawingml/2006/main" xmlns:r="http://schemas.openxmlformats.org/officeDocument/2006/relationships" xmlns:p="http://schemas.openxmlformats.org/presentationml/2006/main">
-  <p:cSld>
-    <p:spTree>
-      <p:nvGrpSpPr>
-        <p:cNvPr id="1" name="">
-          <a:extLst>
-            <a:ext uri="{FF2B5EF4-FFF2-40B4-BE49-F238E27FC236}">
-              <a16:creationId xmlns:a16="http://schemas.microsoft.com/office/drawing/2014/main" id="{9356F78E-69B7-2EE5-E8DA-1AAA8F0A813B}"/>
-            </a:ext>
-          </a:extLst>
-        </p:cNvPr>
-        <p:cNvGrpSpPr/>
-        <p:nvPr/>
-      </p:nvGrpSpPr>
-      <p:grpSpPr>
-        <a:xfrm>
-          <a:off x="0" y="0"/>
-          <a:ext cx="0" cy="0"/>
-          <a:chOff x="0" y="0"/>
-          <a:chExt cx="0" cy="0"/>
-        </a:xfrm>
-      </p:grpSpPr>
-    </p:spTree>
-    <p:extLst>
-      <p:ext uri="{BB962C8B-B14F-4D97-AF65-F5344CB8AC3E}">
-        <p14:creationId xmlns:p14="http://schemas.microsoft.com/office/powerpoint/2010/main" val="2655930251"/>
-      </p:ext>
-    </p:extLst>
-  </p:cSld>
-  <p:clrMapOvr>
-    <a:masterClrMapping/>
-  </p:clrMapOvr>
-</p:sld>
-</file>
-
 <file path=ppt/slides/slide2.xml><?xml version="1.0" encoding="utf-8"?>
 <p:sld xmlns:a="http://schemas.openxmlformats.org/drawingml/2006/main" xmlns:r="http://schemas.openxmlformats.org/officeDocument/2006/relationships" xmlns:p="http://schemas.openxmlformats.org/presentationml/2006/main">
   <p:cSld>
@@ -4365,176 +4325,6 @@
     <p:extLst>
       <p:ext uri="{BB962C8B-B14F-4D97-AF65-F5344CB8AC3E}">
         <p14:creationId xmlns:p14="http://schemas.microsoft.com/office/powerpoint/2010/main" val="740194751"/>
-      </p:ext>
-    </p:extLst>
-  </p:cSld>
-  <p:clrMapOvr>
-    <a:masterClrMapping/>
-  </p:clrMapOvr>
-</p:sld>
-</file>
-
-<file path=ppt/slides/slide7.xml><?xml version="1.0" encoding="utf-8"?>
-<p:sld xmlns:a="http://schemas.openxmlformats.org/drawingml/2006/main" xmlns:r="http://schemas.openxmlformats.org/officeDocument/2006/relationships" xmlns:p="http://schemas.openxmlformats.org/presentationml/2006/main">
-  <p:cSld>
-    <p:bg>
-      <p:bgPr>
-        <a:solidFill>
-          <a:schemeClr val="bg1"/>
-        </a:solidFill>
-        <a:effectLst/>
-      </p:bgPr>
-    </p:bg>
-    <p:spTree>
-      <p:nvGrpSpPr>
-        <p:cNvPr id="1" name=""/>
-        <p:cNvGrpSpPr/>
-        <p:nvPr/>
-      </p:nvGrpSpPr>
-      <p:grpSpPr>
-        <a:xfrm>
-          <a:off x="0" y="0"/>
-          <a:ext cx="0" cy="0"/>
-          <a:chOff x="0" y="0"/>
-          <a:chExt cx="0" cy="0"/>
-        </a:xfrm>
-      </p:grpSpPr>
-      <p:sp useBgFill="1">
-        <p:nvSpPr>
-          <p:cNvPr id="10" name="Rectangle 9">
-            <a:extLst>
-              <a:ext uri="{FF2B5EF4-FFF2-40B4-BE49-F238E27FC236}">
-                <a16:creationId xmlns:a16="http://schemas.microsoft.com/office/drawing/2014/main" id="{4613B4A9-1C7C-4729-A016-AB42D3979460}"/>
-              </a:ext>
-              <a:ext uri="{C183D7F6-B498-43B3-948B-1728B52AA6E4}">
-                <adec:decorative xmlns:adec="http://schemas.microsoft.com/office/drawing/2017/decorative" val="1"/>
-              </a:ext>
-            </a:extLst>
-          </p:cNvPr>
-          <p:cNvSpPr>
-            <a:spLocks noGrp="1" noRot="1" noChangeAspect="1" noMove="1" noResize="1" noEditPoints="1" noAdjustHandles="1" noChangeArrowheads="1" noChangeShapeType="1" noTextEdit="1"/>
-          </p:cNvSpPr>
-          <p:nvPr>
-            <p:extLst>
-              <p:ext uri="{386F3935-93C4-4BCD-93E2-E3B085C9AB24}">
-                <p16:designElem xmlns:p16="http://schemas.microsoft.com/office/powerpoint/2015/main" val="1"/>
-              </p:ext>
-            </p:extLst>
-          </p:nvPr>
-        </p:nvSpPr>
-        <p:spPr>
-          <a:xfrm>
-            <a:off x="0" y="0"/>
-            <a:ext cx="12188952" cy="6858000"/>
-          </a:xfrm>
-          <a:prstGeom prst="rect">
-            <a:avLst/>
-          </a:prstGeom>
-          <a:ln>
-            <a:noFill/>
-          </a:ln>
-        </p:spPr>
-        <p:style>
-          <a:lnRef idx="2">
-            <a:schemeClr val="accent1">
-              <a:shade val="50000"/>
-            </a:schemeClr>
-          </a:lnRef>
-          <a:fillRef idx="1">
-            <a:schemeClr val="accent1"/>
-          </a:fillRef>
-          <a:effectRef idx="0">
-            <a:schemeClr val="accent1"/>
-          </a:effectRef>
-          <a:fontRef idx="minor">
-            <a:schemeClr val="lt1"/>
-          </a:fontRef>
-        </p:style>
-        <p:txBody>
-          <a:bodyPr rtlCol="0" anchor="ctr"/>
-          <a:lstStyle/>
-          <a:p>
-            <a:pPr algn="ctr"/>
-            <a:endParaRPr lang="en-US"/>
-          </a:p>
-        </p:txBody>
-      </p:sp>
-    </p:spTree>
-    <p:extLst>
-      <p:ext uri="{BB962C8B-B14F-4D97-AF65-F5344CB8AC3E}">
-        <p14:creationId xmlns:p14="http://schemas.microsoft.com/office/powerpoint/2010/main" val="1968617866"/>
-      </p:ext>
-    </p:extLst>
-  </p:cSld>
-  <p:clrMapOvr>
-    <a:masterClrMapping/>
-  </p:clrMapOvr>
-</p:sld>
-</file>
-
-<file path=ppt/slides/slide8.xml><?xml version="1.0" encoding="utf-8"?>
-<p:sld xmlns:a="http://schemas.openxmlformats.org/drawingml/2006/main" xmlns:r="http://schemas.openxmlformats.org/officeDocument/2006/relationships" xmlns:p="http://schemas.openxmlformats.org/presentationml/2006/main">
-  <p:cSld>
-    <p:spTree>
-      <p:nvGrpSpPr>
-        <p:cNvPr id="1" name="">
-          <a:extLst>
-            <a:ext uri="{FF2B5EF4-FFF2-40B4-BE49-F238E27FC236}">
-              <a16:creationId xmlns:a16="http://schemas.microsoft.com/office/drawing/2014/main" id="{CBCDC1EA-0282-B11B-C728-F0D80D063CC5}"/>
-            </a:ext>
-          </a:extLst>
-        </p:cNvPr>
-        <p:cNvGrpSpPr/>
-        <p:nvPr/>
-      </p:nvGrpSpPr>
-      <p:grpSpPr>
-        <a:xfrm>
-          <a:off x="0" y="0"/>
-          <a:ext cx="0" cy="0"/>
-          <a:chOff x="0" y="0"/>
-          <a:chExt cx="0" cy="0"/>
-        </a:xfrm>
-      </p:grpSpPr>
-    </p:spTree>
-    <p:extLst>
-      <p:ext uri="{BB962C8B-B14F-4D97-AF65-F5344CB8AC3E}">
-        <p14:creationId xmlns:p14="http://schemas.microsoft.com/office/powerpoint/2010/main" val="2890389970"/>
-      </p:ext>
-    </p:extLst>
-  </p:cSld>
-  <p:clrMapOvr>
-    <a:masterClrMapping/>
-  </p:clrMapOvr>
-</p:sld>
-</file>
-
-<file path=ppt/slides/slide9.xml><?xml version="1.0" encoding="utf-8"?>
-<p:sld xmlns:a="http://schemas.openxmlformats.org/drawingml/2006/main" xmlns:r="http://schemas.openxmlformats.org/officeDocument/2006/relationships" xmlns:p="http://schemas.openxmlformats.org/presentationml/2006/main">
-  <p:cSld>
-    <p:spTree>
-      <p:nvGrpSpPr>
-        <p:cNvPr id="1" name="">
-          <a:extLst>
-            <a:ext uri="{FF2B5EF4-FFF2-40B4-BE49-F238E27FC236}">
-              <a16:creationId xmlns:a16="http://schemas.microsoft.com/office/drawing/2014/main" id="{EFA88F73-9C39-37EC-4247-DC0423D5173F}"/>
-            </a:ext>
-          </a:extLst>
-        </p:cNvPr>
-        <p:cNvGrpSpPr/>
-        <p:nvPr/>
-      </p:nvGrpSpPr>
-      <p:grpSpPr>
-        <a:xfrm>
-          <a:off x="0" y="0"/>
-          <a:ext cx="0" cy="0"/>
-          <a:chOff x="0" y="0"/>
-          <a:chExt cx="0" cy="0"/>
-        </a:xfrm>
-      </p:grpSpPr>
-    </p:spTree>
-    <p:extLst>
-      <p:ext uri="{BB962C8B-B14F-4D97-AF65-F5344CB8AC3E}">
-        <p14:creationId xmlns:p14="http://schemas.microsoft.com/office/powerpoint/2010/main" val="3545121507"/>
       </p:ext>
     </p:extLst>
   </p:cSld>

</xml_diff>